<commit_message>
Last test run, more changes to report and presentation.
</commit_message>
<xml_diff>
--- a/Service Final Presentation.pptx
+++ b/Service Final Presentation.pptx
@@ -1175,16 +1175,40 @@
           </a:bodyPr>
           <a:lstStyle/>
           <a:p>
-            <a:pPr lvl="0" rtl="0">
+            <a:pPr lvl="0">
               <a:spcBef>
                 <a:spcPts val="0"/>
               </a:spcBef>
               <a:buNone/>
             </a:pPr>
             <a:r>
-              <a:t/>
+              <a:rPr lang="en"/>
+              <a:t>Adding property managers and their specific actions, find ways to prove they are responsible for specific properties.</a:t>
             </a:r>
-            <a:endParaRPr/>
+          </a:p>
+          <a:p>
+            <a:pPr lvl="0">
+              <a:spcBef>
+                <a:spcPts val="0"/>
+              </a:spcBef>
+              <a:buNone/>
+            </a:pPr>
+            <a:r>
+              <a:rPr lang="en"/>
+              <a:t>Improve the ability of admins to monitor community, automate picture scanning with deep learning, come up with way to validate property managers automatically.</a:t>
+            </a:r>
+          </a:p>
+          <a:p>
+            <a:pPr lvl="0" rtl="0">
+              <a:spcBef>
+                <a:spcPts val="0"/>
+              </a:spcBef>
+              <a:buNone/>
+            </a:pPr>
+            <a:r>
+              <a:rPr lang="en"/>
+              <a:t>Get off of WebRatio, deploy private servers or move to AWS, move to TDD, have better role separation and responsibilities clearly defined.</a:t>
+            </a:r>
           </a:p>
         </p:txBody>
       </p:sp>
@@ -5249,72 +5273,77 @@
           </a:bodyPr>
           <a:lstStyle/>
           <a:p>
-            <a:pPr indent="-228600" lvl="0" marL="457200" rtl="0">
+            <a:pPr indent="-406400" lvl="0" marL="457200" rtl="0">
               <a:lnSpc>
                 <a:spcPct val="150000"/>
               </a:lnSpc>
               <a:spcBef>
                 <a:spcPts val="0"/>
               </a:spcBef>
+              <a:buSzPct val="100000"/>
             </a:pPr>
             <a:r>
-              <a:rPr lang="en"/>
+              <a:rPr lang="en" sz="2800"/>
               <a:t>What is Service?</a:t>
             </a:r>
           </a:p>
           <a:p>
-            <a:pPr indent="-228600" lvl="0" marL="457200" rtl="0">
+            <a:pPr indent="-406400" lvl="0" marL="457200" rtl="0">
               <a:lnSpc>
                 <a:spcPct val="150000"/>
               </a:lnSpc>
               <a:spcBef>
                 <a:spcPts val="0"/>
               </a:spcBef>
+              <a:buSzPct val="100000"/>
             </a:pPr>
             <a:r>
-              <a:rPr lang="en"/>
+              <a:rPr lang="en" sz="2800"/>
               <a:t>Who are we?</a:t>
             </a:r>
           </a:p>
           <a:p>
-            <a:pPr indent="-228600" lvl="0" marL="457200" rtl="0">
+            <a:pPr indent="-406400" lvl="0" marL="457200" rtl="0">
               <a:lnSpc>
                 <a:spcPct val="150000"/>
               </a:lnSpc>
               <a:spcBef>
                 <a:spcPts val="0"/>
               </a:spcBef>
+              <a:buSzPct val="100000"/>
             </a:pPr>
             <a:r>
-              <a:rPr lang="en"/>
+              <a:rPr lang="en" sz="2800"/>
               <a:t>How did we do it?</a:t>
             </a:r>
           </a:p>
           <a:p>
-            <a:pPr indent="-228600" lvl="0" marL="457200" rtl="0">
+            <a:pPr indent="-406400" lvl="0" marL="457200" rtl="0">
               <a:lnSpc>
                 <a:spcPct val="150000"/>
               </a:lnSpc>
               <a:spcBef>
                 <a:spcPts val="0"/>
               </a:spcBef>
+              <a:buSzPct val="100000"/>
             </a:pPr>
             <a:r>
-              <a:rPr lang="en"/>
+              <a:rPr lang="en" sz="2800"/>
               <a:t>Does it work?</a:t>
             </a:r>
           </a:p>
           <a:p>
-            <a:pPr indent="-228600" lvl="0" marL="457200" rtl="0">
+            <a:pPr indent="-406400" lvl="0" marL="457200" rtl="0">
               <a:lnSpc>
                 <a:spcPct val="150000"/>
               </a:lnSpc>
               <a:spcBef>
                 <a:spcPts val="0"/>
               </a:spcBef>
+              <a:buSzPct val="100000"/>
             </a:pPr>
             <a:r>
-              <a:rPr lang="en"/>
+              <a:rPr lang="en" sz="2800"/>
               <a:t>What’s left to do?</a:t>
             </a:r>
           </a:p>
@@ -6198,11 +6227,14 @@
           <a:p>
             <a:pPr indent="-228600" lvl="0" marL="457200" rtl="0">
               <a:lnSpc>
-                <a:spcPct val="115000"/>
+                <a:spcPct val="100000"/>
               </a:lnSpc>
               <a:spcBef>
                 <a:spcPts val="0"/>
               </a:spcBef>
+              <a:spcAft>
+                <a:spcPts val="1000"/>
+              </a:spcAft>
             </a:pPr>
             <a:r>
               <a:rPr lang="en"/>
@@ -6212,25 +6244,31 @@
           <a:p>
             <a:pPr indent="-228600" lvl="0" marL="457200" rtl="0">
               <a:lnSpc>
-                <a:spcPct val="115000"/>
+                <a:spcPct val="100000"/>
               </a:lnSpc>
               <a:spcBef>
                 <a:spcPts val="0"/>
               </a:spcBef>
+              <a:spcAft>
+                <a:spcPts val="1000"/>
+              </a:spcAft>
             </a:pPr>
             <a:r>
               <a:rPr lang="en"/>
-              <a:t>Open platform - anyone can view and create service requests</a:t>
+              <a:t>Open platform – anyone can view and create service requests</a:t>
             </a:r>
           </a:p>
           <a:p>
             <a:pPr indent="-228600" lvl="0" marL="457200" rtl="0">
               <a:lnSpc>
-                <a:spcPct val="115000"/>
+                <a:spcPct val="100000"/>
               </a:lnSpc>
               <a:spcBef>
                 <a:spcPts val="0"/>
               </a:spcBef>
+              <a:spcAft>
+                <a:spcPts val="1000"/>
+              </a:spcAft>
             </a:pPr>
             <a:r>
               <a:rPr lang="en"/>
@@ -6240,11 +6278,14 @@
           <a:p>
             <a:pPr indent="-228600" lvl="0" marL="457200" rtl="0">
               <a:lnSpc>
-                <a:spcPct val="115000"/>
+                <a:spcPct val="100000"/>
               </a:lnSpc>
               <a:spcBef>
                 <a:spcPts val="0"/>
               </a:spcBef>
+              <a:spcAft>
+                <a:spcPts val="1000"/>
+              </a:spcAft>
             </a:pPr>
             <a:r>
               <a:rPr lang="en"/>
@@ -6372,7 +6413,7 @@
           <a:p>
             <a:pPr lvl="0" rtl="0">
               <a:lnSpc>
-                <a:spcPct val="115000"/>
+                <a:spcPct val="150000"/>
               </a:lnSpc>
               <a:spcBef>
                 <a:spcPts val="0"/>
@@ -6387,7 +6428,7 @@
           <a:p>
             <a:pPr lvl="0" rtl="0">
               <a:lnSpc>
-                <a:spcPct val="115000"/>
+                <a:spcPct val="150000"/>
               </a:lnSpc>
               <a:spcBef>
                 <a:spcPts val="0"/>
@@ -6402,7 +6443,7 @@
           <a:p>
             <a:pPr lvl="0" rtl="0">
               <a:lnSpc>
-                <a:spcPct val="115000"/>
+                <a:spcPct val="150000"/>
               </a:lnSpc>
               <a:spcBef>
                 <a:spcPts val="0"/>
@@ -6426,7 +6467,7 @@
           <a:p>
             <a:pPr lvl="0" rtl="0">
               <a:lnSpc>
-                <a:spcPct val="115000"/>
+                <a:spcPct val="150000"/>
               </a:lnSpc>
               <a:spcBef>
                 <a:spcPts val="0"/>
@@ -6445,7 +6486,7 @@
           <a:p>
             <a:pPr lvl="0" rtl="0">
               <a:lnSpc>
-                <a:spcPct val="115000"/>
+                <a:spcPct val="150000"/>
               </a:lnSpc>
               <a:spcBef>
                 <a:spcPts val="0"/>
@@ -6507,7 +6548,7 @@
         </p:nvSpPr>
         <p:spPr>
           <a:xfrm>
-            <a:off x="2650354" y="1322996"/>
+            <a:off x="2650354" y="1354746"/>
             <a:ext cx="311199" cy="311219"/>
           </a:xfrm>
           <a:custGeom>
@@ -8841,7 +8882,7 @@
         </p:nvSpPr>
         <p:spPr>
           <a:xfrm>
-            <a:off x="2650354" y="1845308"/>
+            <a:off x="2650354" y="1978221"/>
             <a:ext cx="311199" cy="311219"/>
           </a:xfrm>
           <a:custGeom>
@@ -9466,7 +9507,7 @@
         </p:nvSpPr>
         <p:spPr>
           <a:xfrm>
-            <a:off x="2650354" y="2320958"/>
+            <a:off x="2650354" y="2601671"/>
             <a:ext cx="311199" cy="311219"/>
           </a:xfrm>
           <a:custGeom>
@@ -10091,7 +10132,7 @@
         </p:nvSpPr>
         <p:spPr>
           <a:xfrm>
-            <a:off x="2650354" y="2819933"/>
+            <a:off x="2650354" y="3241008"/>
             <a:ext cx="311199" cy="311219"/>
           </a:xfrm>
           <a:custGeom>
@@ -10716,7 +10757,7 @@
         </p:nvSpPr>
         <p:spPr>
           <a:xfrm>
-            <a:off x="2650354" y="3318908"/>
+            <a:off x="2650354" y="3869758"/>
             <a:ext cx="311199" cy="311219"/>
           </a:xfrm>
           <a:custGeom>
@@ -13448,18 +13489,6 @@
               <a:t>Rebuild</a:t>
             </a:r>
           </a:p>
-          <a:p>
-            <a:pPr indent="-330200" lvl="0" marL="457200">
-              <a:spcBef>
-                <a:spcPts val="0"/>
-              </a:spcBef>
-              <a:buSzPct val="100000"/>
-            </a:pPr>
-            <a:r>
-              <a:rPr lang="en" sz="1600"/>
-              <a:t>Alternatives</a:t>
-            </a:r>
-          </a:p>
         </p:txBody>
       </p:sp>
       <p:sp>
@@ -13601,7 +13630,7 @@
             </a:pPr>
             <a:r>
               <a:rPr lang="en" sz="1600"/>
-              <a:t>Vs Jira</a:t>
+              <a:t>vs. Jira</a:t>
             </a:r>
           </a:p>
         </p:txBody>
@@ -13866,18 +13895,6 @@
             <a:r>
               <a:rPr lang="en" sz="1600"/>
               <a:t>Dense</a:t>
-            </a:r>
-          </a:p>
-          <a:p>
-            <a:pPr indent="-330200" lvl="0" marL="457200" rtl="0">
-              <a:spcBef>
-                <a:spcPts val="0"/>
-              </a:spcBef>
-              <a:buSzPct val="100000"/>
-            </a:pPr>
-            <a:r>
-              <a:rPr lang="en" sz="1600"/>
-              <a:t>Alternatives</a:t>
             </a:r>
           </a:p>
           <a:p>
@@ -15229,47 +15246,56 @@
             </a:r>
           </a:p>
           <a:p>
-            <a:pPr indent="-330200" lvl="0" marL="457200" rtl="0">
+            <a:pPr indent="-342900" lvl="0" marL="457200" rtl="0">
               <a:lnSpc>
-                <a:spcPct val="150000"/>
+                <a:spcPct val="100000"/>
               </a:lnSpc>
               <a:spcBef>
                 <a:spcPts val="0"/>
               </a:spcBef>
+              <a:spcAft>
+                <a:spcPts val="1000"/>
+              </a:spcAft>
               <a:buSzPct val="100000"/>
             </a:pPr>
             <a:r>
-              <a:rPr lang="en" sz="1600"/>
+              <a:rPr lang="en" sz="1800"/>
               <a:t>Creation</a:t>
             </a:r>
           </a:p>
           <a:p>
-            <a:pPr indent="-330200" lvl="0" marL="457200" rtl="0">
+            <a:pPr indent="-342900" lvl="0" marL="457200" rtl="0">
               <a:lnSpc>
-                <a:spcPct val="150000"/>
+                <a:spcPct val="100000"/>
               </a:lnSpc>
               <a:spcBef>
                 <a:spcPts val="0"/>
               </a:spcBef>
+              <a:spcAft>
+                <a:spcPts val="1000"/>
+              </a:spcAft>
               <a:buSzPct val="100000"/>
             </a:pPr>
             <a:r>
-              <a:rPr lang="en" sz="1600"/>
+              <a:rPr lang="en" sz="1800"/>
               <a:t>Login</a:t>
             </a:r>
           </a:p>
           <a:p>
-            <a:pPr indent="-330200" lvl="0" marL="457200" rtl="0">
+            <a:pPr indent="-342900" lvl="0" marL="457200" rtl="0">
               <a:lnSpc>
-                <a:spcPct val="150000"/>
+                <a:spcPct val="100000"/>
               </a:lnSpc>
               <a:spcBef>
                 <a:spcPts val="0"/>
               </a:spcBef>
+              <a:spcAft>
+                <a:spcPts val="1000"/>
+              </a:spcAft>
               <a:buSzPct val="100000"/>
             </a:pPr>
             <a:r>
-              <a:rPr lang="en" sz="1600"/>
+              <a:rPr lang="en" sz="1800"/>
               <a:t>Administration</a:t>
             </a:r>
           </a:p>
@@ -15310,47 +15336,56 @@
             </a:r>
           </a:p>
           <a:p>
-            <a:pPr indent="-330200" lvl="0" marL="457200" rtl="0">
+            <a:pPr indent="-342900" lvl="0" marL="457200" rtl="0">
               <a:lnSpc>
-                <a:spcPct val="150000"/>
+                <a:spcPct val="100000"/>
               </a:lnSpc>
               <a:spcBef>
                 <a:spcPts val="0"/>
               </a:spcBef>
+              <a:spcAft>
+                <a:spcPts val="1000"/>
+              </a:spcAft>
               <a:buSzPct val="100000"/>
             </a:pPr>
             <a:r>
-              <a:rPr lang="en" sz="1600"/>
+              <a:rPr lang="en" sz="1800"/>
               <a:t>View</a:t>
             </a:r>
           </a:p>
           <a:p>
-            <a:pPr indent="-330200" lvl="0" marL="457200" rtl="0">
+            <a:pPr indent="-342900" lvl="0" marL="457200" rtl="0">
               <a:lnSpc>
-                <a:spcPct val="150000"/>
+                <a:spcPct val="100000"/>
               </a:lnSpc>
               <a:spcBef>
                 <a:spcPts val="0"/>
               </a:spcBef>
+              <a:spcAft>
+                <a:spcPts val="1000"/>
+              </a:spcAft>
               <a:buSzPct val="100000"/>
             </a:pPr>
             <a:r>
-              <a:rPr lang="en" sz="1600"/>
+              <a:rPr lang="en" sz="1800"/>
               <a:t>Create</a:t>
             </a:r>
           </a:p>
           <a:p>
-            <a:pPr indent="-330200" lvl="0" marL="457200">
+            <a:pPr indent="-342900" lvl="0" marL="457200">
               <a:lnSpc>
-                <a:spcPct val="150000"/>
+                <a:spcPct val="100000"/>
               </a:lnSpc>
               <a:spcBef>
                 <a:spcPts val="0"/>
               </a:spcBef>
+              <a:spcAft>
+                <a:spcPts val="1000"/>
+              </a:spcAft>
               <a:buSzPct val="100000"/>
             </a:pPr>
             <a:r>
-              <a:rPr lang="en" sz="1600"/>
+              <a:rPr lang="en" sz="1800"/>
               <a:t>Manage</a:t>
             </a:r>
           </a:p>
@@ -15391,47 +15426,56 @@
             </a:r>
           </a:p>
           <a:p>
-            <a:pPr indent="-330200" lvl="0" marL="457200" rtl="0">
+            <a:pPr indent="-342900" lvl="0" marL="457200" rtl="0">
               <a:lnSpc>
-                <a:spcPct val="150000"/>
+                <a:spcPct val="100000"/>
               </a:lnSpc>
               <a:spcBef>
                 <a:spcPts val="0"/>
               </a:spcBef>
+              <a:spcAft>
+                <a:spcPts val="1000"/>
+              </a:spcAft>
               <a:buSzPct val="100000"/>
             </a:pPr>
             <a:r>
-              <a:rPr lang="en" sz="1600"/>
+              <a:rPr lang="en" sz="1800"/>
               <a:t>Modified templates</a:t>
             </a:r>
           </a:p>
           <a:p>
-            <a:pPr indent="-330200" lvl="0" marL="457200" rtl="0">
+            <a:pPr indent="-342900" lvl="0" marL="457200" rtl="0">
               <a:lnSpc>
-                <a:spcPct val="150000"/>
+                <a:spcPct val="100000"/>
               </a:lnSpc>
               <a:spcBef>
                 <a:spcPts val="0"/>
               </a:spcBef>
+              <a:spcAft>
+                <a:spcPts val="1000"/>
+              </a:spcAft>
               <a:buSzPct val="100000"/>
             </a:pPr>
             <a:r>
-              <a:rPr lang="en" sz="1600"/>
+              <a:rPr lang="en" sz="1800"/>
               <a:t>Design</a:t>
             </a:r>
           </a:p>
           <a:p>
-            <a:pPr indent="-330200" lvl="0" marL="457200">
+            <a:pPr indent="-342900" lvl="0" marL="457200">
               <a:lnSpc>
-                <a:spcPct val="150000"/>
+                <a:spcPct val="100000"/>
               </a:lnSpc>
               <a:spcBef>
                 <a:spcPts val="0"/>
               </a:spcBef>
+              <a:spcAft>
+                <a:spcPts val="1000"/>
+              </a:spcAft>
               <a:buSzPct val="100000"/>
             </a:pPr>
             <a:r>
-              <a:rPr lang="en" sz="1600"/>
+              <a:rPr lang="en" sz="1800"/>
               <a:t>Layout</a:t>
             </a:r>
           </a:p>
@@ -16614,7 +16658,7 @@
         </p:nvSpPr>
         <p:spPr>
           <a:xfrm>
-            <a:off x="2292199" y="1085100"/>
+            <a:off x="2215999" y="1085100"/>
             <a:ext cx="2343600" cy="3840900"/>
           </a:xfrm>
           <a:prstGeom prst="rect">
@@ -16639,26 +16683,32 @@
             </a:r>
           </a:p>
           <a:p>
-            <a:pPr indent="-330200" lvl="0" marL="457200" rtl="0">
-              <a:spcBef>
-                <a:spcPts val="0"/>
-              </a:spcBef>
+            <a:pPr indent="-342900" lvl="0" marL="457200" rtl="0">
+              <a:spcBef>
+                <a:spcPts val="0"/>
+              </a:spcBef>
+              <a:spcAft>
+                <a:spcPts val="1000"/>
+              </a:spcAft>
               <a:buSzPct val="100000"/>
             </a:pPr>
             <a:r>
-              <a:rPr lang="en" sz="1600"/>
+              <a:rPr lang="en" sz="1800"/>
               <a:t>Validation</a:t>
             </a:r>
           </a:p>
           <a:p>
-            <a:pPr indent="-330200" lvl="0" marL="457200">
-              <a:spcBef>
-                <a:spcPts val="0"/>
-              </a:spcBef>
+            <a:pPr indent="-342900" lvl="0" marL="457200">
+              <a:spcBef>
+                <a:spcPts val="0"/>
+              </a:spcBef>
+              <a:spcAft>
+                <a:spcPts val="1000"/>
+              </a:spcAft>
               <a:buSzPct val="100000"/>
             </a:pPr>
             <a:r>
-              <a:rPr lang="en" sz="1600"/>
+              <a:rPr lang="en" sz="1800"/>
               <a:t>Responding</a:t>
             </a:r>
           </a:p>
@@ -16674,8 +16724,8 @@
         </p:nvSpPr>
         <p:spPr>
           <a:xfrm>
-            <a:off x="4656783" y="1085100"/>
-            <a:ext cx="1896300" cy="3840900"/>
+            <a:off x="4504374" y="1085100"/>
+            <a:ext cx="2076000" cy="3840900"/>
           </a:xfrm>
           <a:prstGeom prst="rect">
             <a:avLst/>
@@ -16699,26 +16749,32 @@
             </a:r>
           </a:p>
           <a:p>
-            <a:pPr indent="-330200" lvl="0" marL="457200" rtl="0">
-              <a:spcBef>
-                <a:spcPts val="0"/>
-              </a:spcBef>
+            <a:pPr indent="-342900" lvl="0" marL="457200" rtl="0">
+              <a:spcBef>
+                <a:spcPts val="0"/>
+              </a:spcBef>
+              <a:spcAft>
+                <a:spcPts val="1000"/>
+              </a:spcAft>
               <a:buSzPct val="100000"/>
             </a:pPr>
             <a:r>
-              <a:rPr lang="en" sz="1600"/>
+              <a:rPr lang="en" sz="1800"/>
               <a:t>Automation</a:t>
             </a:r>
           </a:p>
           <a:p>
-            <a:pPr indent="-330200" lvl="0" marL="457200">
-              <a:spcBef>
-                <a:spcPts val="0"/>
-              </a:spcBef>
+            <a:pPr indent="-342900" lvl="0" marL="457200">
+              <a:spcBef>
+                <a:spcPts val="0"/>
+              </a:spcBef>
+              <a:spcAft>
+                <a:spcPts val="1000"/>
+              </a:spcAft>
               <a:buSzPct val="100000"/>
             </a:pPr>
             <a:r>
-              <a:rPr lang="en" sz="1600"/>
+              <a:rPr lang="en" sz="1800"/>
               <a:t>Workflows</a:t>
             </a:r>
           </a:p>
@@ -16734,8 +16790,8 @@
         </p:nvSpPr>
         <p:spPr>
           <a:xfrm>
-            <a:off x="6726400" y="1085100"/>
-            <a:ext cx="2002200" cy="3840900"/>
+            <a:off x="6573999" y="1085100"/>
+            <a:ext cx="2154600" cy="3840900"/>
           </a:xfrm>
           <a:prstGeom prst="rect">
             <a:avLst/>
@@ -16759,26 +16815,32 @@
             </a:r>
           </a:p>
           <a:p>
-            <a:pPr indent="-330200" lvl="0" marL="457200" rtl="0">
-              <a:spcBef>
-                <a:spcPts val="0"/>
-              </a:spcBef>
+            <a:pPr indent="-342900" lvl="0" marL="457200" rtl="0">
+              <a:spcBef>
+                <a:spcPts val="0"/>
+              </a:spcBef>
+              <a:spcAft>
+                <a:spcPts val="1000"/>
+              </a:spcAft>
               <a:buSzPct val="100000"/>
             </a:pPr>
             <a:r>
-              <a:rPr lang="en" sz="1600"/>
+              <a:rPr lang="en" sz="1800"/>
               <a:t>Hosting</a:t>
             </a:r>
           </a:p>
           <a:p>
-            <a:pPr indent="-330200" lvl="0" marL="457200">
-              <a:spcBef>
-                <a:spcPts val="0"/>
-              </a:spcBef>
+            <a:pPr indent="-342900" lvl="0" marL="457200">
+              <a:spcBef>
+                <a:spcPts val="0"/>
+              </a:spcBef>
+              <a:spcAft>
+                <a:spcPts val="1000"/>
+              </a:spcAft>
               <a:buSzPct val="100000"/>
             </a:pPr>
             <a:r>
-              <a:rPr lang="en" sz="1600"/>
+              <a:rPr lang="en" sz="1800"/>
               <a:t>Development system</a:t>
             </a:r>
           </a:p>

</xml_diff>